<commit_message>
added code examples +exercises
</commit_message>
<xml_diff>
--- a/Creating Your First ERC 20 Token!.pptx
+++ b/Creating Your First ERC 20 Token!.pptx
@@ -16,6 +16,10 @@
     <p:sldId id="264" r:id="rId10"/>
     <p:sldId id="265" r:id="rId11"/>
     <p:sldId id="266" r:id="rId12"/>
+    <p:sldId id="267" r:id="rId13"/>
+    <p:sldId id="269" r:id="rId14"/>
+    <p:sldId id="270" r:id="rId15"/>
+    <p:sldId id="268" r:id="rId16"/>
   </p:sldIdLst>
   <p:sldSz cx="12192000" cy="6858000"/>
   <p:notesSz cx="6858000" cy="9144000"/>
@@ -6679,7 +6683,7 @@
           <a:p>
             <a:fld id="{02AC24A9-CCB6-4F8D-B8DB-C2F3692CFA5A}" type="datetimeFigureOut">
               <a:rPr lang="en-US" smtClean="0"/>
-              <a:t>3/28/2022</a:t>
+              <a:t>3/29/2022</a:t>
             </a:fld>
             <a:endParaRPr lang="en-US" dirty="0"/>
           </a:p>
@@ -7049,7 +7053,7 @@
           <a:p>
             <a:fld id="{02AC24A9-CCB6-4F8D-B8DB-C2F3692CFA5A}" type="datetimeFigureOut">
               <a:rPr lang="en-US" smtClean="0"/>
-              <a:t>3/28/2022</a:t>
+              <a:t>3/29/2022</a:t>
             </a:fld>
             <a:endParaRPr lang="en-US"/>
           </a:p>
@@ -7258,7 +7262,7 @@
           <a:p>
             <a:fld id="{02AC24A9-CCB6-4F8D-B8DB-C2F3692CFA5A}" type="datetimeFigureOut">
               <a:rPr lang="en-US" smtClean="0"/>
-              <a:t>3/28/2022</a:t>
+              <a:t>3/29/2022</a:t>
             </a:fld>
             <a:endParaRPr lang="en-US"/>
           </a:p>
@@ -7728,7 +7732,7 @@
           <a:p>
             <a:fld id="{02AC24A9-CCB6-4F8D-B8DB-C2F3692CFA5A}" type="datetimeFigureOut">
               <a:rPr lang="en-US" smtClean="0"/>
-              <a:t>3/28/2022</a:t>
+              <a:t>3/29/2022</a:t>
             </a:fld>
             <a:endParaRPr lang="en-US"/>
           </a:p>
@@ -8182,7 +8186,7 @@
           <a:p>
             <a:fld id="{02AC24A9-CCB6-4F8D-B8DB-C2F3692CFA5A}" type="datetimeFigureOut">
               <a:rPr lang="en-US" smtClean="0"/>
-              <a:t>3/28/2022</a:t>
+              <a:t>3/29/2022</a:t>
             </a:fld>
             <a:endParaRPr lang="en-US"/>
           </a:p>
@@ -8714,7 +8718,7 @@
           <a:p>
             <a:fld id="{02AC24A9-CCB6-4F8D-B8DB-C2F3692CFA5A}" type="datetimeFigureOut">
               <a:rPr lang="en-US" smtClean="0"/>
-              <a:t>3/28/2022</a:t>
+              <a:t>3/29/2022</a:t>
             </a:fld>
             <a:endParaRPr lang="en-US"/>
           </a:p>
@@ -9413,7 +9417,7 @@
           <a:p>
             <a:fld id="{02AC24A9-CCB6-4F8D-B8DB-C2F3692CFA5A}" type="datetimeFigureOut">
               <a:rPr lang="en-US" smtClean="0"/>
-              <a:t>3/28/2022</a:t>
+              <a:t>3/29/2022</a:t>
             </a:fld>
             <a:endParaRPr lang="en-US"/>
           </a:p>
@@ -9742,7 +9746,7 @@
           <a:p>
             <a:fld id="{02AC24A9-CCB6-4F8D-B8DB-C2F3692CFA5A}" type="datetimeFigureOut">
               <a:rPr lang="en-US" smtClean="0"/>
-              <a:t>3/28/2022</a:t>
+              <a:t>3/29/2022</a:t>
             </a:fld>
             <a:endParaRPr lang="en-US"/>
           </a:p>
@@ -9855,7 +9859,7 @@
           <a:p>
             <a:fld id="{02AC24A9-CCB6-4F8D-B8DB-C2F3692CFA5A}" type="datetimeFigureOut">
               <a:rPr lang="en-US" smtClean="0"/>
-              <a:t>3/28/2022</a:t>
+              <a:t>3/29/2022</a:t>
             </a:fld>
             <a:endParaRPr lang="en-US"/>
           </a:p>
@@ -10350,7 +10354,7 @@
           <a:p>
             <a:fld id="{02AC24A9-CCB6-4F8D-B8DB-C2F3692CFA5A}" type="datetimeFigureOut">
               <a:rPr lang="en-US" smtClean="0"/>
-              <a:t>3/28/2022</a:t>
+              <a:t>3/29/2022</a:t>
             </a:fld>
             <a:endParaRPr lang="en-US" dirty="0"/>
           </a:p>
@@ -10827,7 +10831,7 @@
           <a:p>
             <a:fld id="{02AC24A9-CCB6-4F8D-B8DB-C2F3692CFA5A}" type="datetimeFigureOut">
               <a:rPr lang="en-US" smtClean="0"/>
-              <a:t>3/28/2022</a:t>
+              <a:t>3/29/2022</a:t>
             </a:fld>
             <a:endParaRPr lang="en-US"/>
           </a:p>
@@ -11070,7 +11074,7 @@
           <a:p>
             <a:fld id="{02AC24A9-CCB6-4F8D-B8DB-C2F3692CFA5A}" type="datetimeFigureOut">
               <a:rPr lang="en-US" smtClean="0"/>
-              <a:t>3/28/2022</a:t>
+              <a:t>3/29/2022</a:t>
             </a:fld>
             <a:endParaRPr lang="en-US"/>
           </a:p>
@@ -12015,8 +12019,44 @@
             </a:r>
             <a:endParaRPr lang="en-US" dirty="0"/>
           </a:p>
+          <a:p>
+            <a:r>
+              <a:rPr lang="en-US" dirty="0"/>
+              <a:t>Public field</a:t>
+            </a:r>
+          </a:p>
         </p:txBody>
       </p:sp>
+      <p:pic>
+        <p:nvPicPr>
+          <p:cNvPr id="5" name="Picture 4">
+            <a:extLst>
+              <a:ext uri="{FF2B5EF4-FFF2-40B4-BE49-F238E27FC236}">
+                <a16:creationId xmlns:a16="http://schemas.microsoft.com/office/drawing/2014/main" id="{F7DE9EB9-68B3-4CAE-9732-40E678DF6F1B}"/>
+              </a:ext>
+            </a:extLst>
+          </p:cNvPr>
+          <p:cNvPicPr>
+            <a:picLocks noChangeAspect="1"/>
+          </p:cNvPicPr>
+          <p:nvPr/>
+        </p:nvPicPr>
+        <p:blipFill>
+          <a:blip r:embed="rId2"/>
+          <a:stretch>
+            <a:fillRect/>
+          </a:stretch>
+        </p:blipFill>
+        <p:spPr>
+          <a:xfrm>
+            <a:off x="4317477" y="2478024"/>
+            <a:ext cx="7120379" cy="2523091"/>
+          </a:xfrm>
+          <a:prstGeom prst="rect">
+            <a:avLst/>
+          </a:prstGeom>
+        </p:spPr>
+      </p:pic>
     </p:spTree>
     <p:extLst>
       <p:ext uri="{BB962C8B-B14F-4D97-AF65-F5344CB8AC3E}">
@@ -12068,7 +12108,10 @@
           <a:bodyPr/>
           <a:lstStyle/>
           <a:p>
-            <a:endParaRPr lang="en-US" dirty="0"/>
+            <a:r>
+              <a:rPr lang="en-US" dirty="0"/>
+              <a:t>Functions Example</a:t>
+            </a:r>
           </a:p>
         </p:txBody>
       </p:sp>
@@ -12093,7 +12136,23 @@
           <a:bodyPr/>
           <a:lstStyle/>
           <a:p>
-            <a:endParaRPr lang="en-US"/>
+            <a:r>
+              <a:rPr lang="en-US" dirty="0" err="1"/>
+              <a:t>functions.sol</a:t>
+            </a:r>
+            <a:endParaRPr lang="en-US" dirty="0"/>
+          </a:p>
+          <a:p>
+            <a:r>
+              <a:rPr lang="en-US" dirty="0"/>
+              <a:t>Functions to retrieve state and set state</a:t>
+            </a:r>
+          </a:p>
+          <a:p>
+            <a:pPr marL="0" indent="0">
+              <a:buNone/>
+            </a:pPr>
+            <a:endParaRPr lang="en-US" dirty="0"/>
           </a:p>
         </p:txBody>
       </p:sp>
@@ -12101,6 +12160,544 @@
     <p:extLst>
       <p:ext uri="{BB962C8B-B14F-4D97-AF65-F5344CB8AC3E}">
         <p14:creationId xmlns:p14="http://schemas.microsoft.com/office/powerpoint/2010/main" val="1850405216"/>
+      </p:ext>
+    </p:extLst>
+  </p:cSld>
+  <p:clrMapOvr>
+    <a:masterClrMapping/>
+  </p:clrMapOvr>
+</p:sld>
+</file>
+
+<file path=ppt/slides/slide12.xml><?xml version="1.0" encoding="utf-8"?>
+<p:sld xmlns:a="http://schemas.openxmlformats.org/drawingml/2006/main" xmlns:r="http://schemas.openxmlformats.org/officeDocument/2006/relationships" xmlns:p="http://schemas.openxmlformats.org/presentationml/2006/main">
+  <p:cSld>
+    <p:spTree>
+      <p:nvGrpSpPr>
+        <p:cNvPr id="1" name=""/>
+        <p:cNvGrpSpPr/>
+        <p:nvPr/>
+      </p:nvGrpSpPr>
+      <p:grpSpPr>
+        <a:xfrm>
+          <a:off x="0" y="0"/>
+          <a:ext cx="0" cy="0"/>
+          <a:chOff x="0" y="0"/>
+          <a:chExt cx="0" cy="0"/>
+        </a:xfrm>
+      </p:grpSpPr>
+      <p:sp>
+        <p:nvSpPr>
+          <p:cNvPr id="2" name="Title 1">
+            <a:extLst>
+              <a:ext uri="{FF2B5EF4-FFF2-40B4-BE49-F238E27FC236}">
+                <a16:creationId xmlns:a16="http://schemas.microsoft.com/office/drawing/2014/main" id="{089D0944-E2E0-41EF-904E-CD3C4656F194}"/>
+              </a:ext>
+            </a:extLst>
+          </p:cNvPr>
+          <p:cNvSpPr>
+            <a:spLocks noGrp="1"/>
+          </p:cNvSpPr>
+          <p:nvPr>
+            <p:ph type="title"/>
+          </p:nvPr>
+        </p:nvSpPr>
+        <p:spPr/>
+        <p:txBody>
+          <a:bodyPr/>
+          <a:lstStyle/>
+          <a:p>
+            <a:r>
+              <a:rPr lang="en-US" dirty="0"/>
+              <a:t>Validation Example</a:t>
+            </a:r>
+          </a:p>
+        </p:txBody>
+      </p:sp>
+      <p:sp>
+        <p:nvSpPr>
+          <p:cNvPr id="3" name="Content Placeholder 2">
+            <a:extLst>
+              <a:ext uri="{FF2B5EF4-FFF2-40B4-BE49-F238E27FC236}">
+                <a16:creationId xmlns:a16="http://schemas.microsoft.com/office/drawing/2014/main" id="{3A394278-7FA3-4911-90BE-A9136132938A}"/>
+              </a:ext>
+            </a:extLst>
+          </p:cNvPr>
+          <p:cNvSpPr>
+            <a:spLocks noGrp="1"/>
+          </p:cNvSpPr>
+          <p:nvPr>
+            <p:ph idx="1"/>
+          </p:nvPr>
+        </p:nvSpPr>
+        <p:spPr/>
+        <p:txBody>
+          <a:bodyPr/>
+          <a:lstStyle/>
+          <a:p>
+            <a:r>
+              <a:rPr lang="en-US" dirty="0"/>
+              <a:t>In solidity the require statement is frequently used for validation</a:t>
+            </a:r>
+          </a:p>
+          <a:p>
+            <a:r>
+              <a:rPr lang="en-US" dirty="0"/>
+              <a:t>The usage is the following:</a:t>
+            </a:r>
+          </a:p>
+          <a:p>
+            <a:pPr lvl="1"/>
+            <a:r>
+              <a:rPr lang="en-US" dirty="0"/>
+              <a:t>Require(&lt;condition&gt;, &lt;error message&gt;)</a:t>
+            </a:r>
+          </a:p>
+          <a:p>
+            <a:r>
+              <a:rPr lang="en-US" dirty="0"/>
+              <a:t>Example in </a:t>
+            </a:r>
+            <a:r>
+              <a:rPr lang="en-US" dirty="0" err="1"/>
+              <a:t>validation.sol</a:t>
+            </a:r>
+            <a:endParaRPr lang="en-US" dirty="0"/>
+          </a:p>
+          <a:p>
+            <a:r>
+              <a:rPr lang="en-US" dirty="0"/>
+              <a:t>Exercise in </a:t>
+            </a:r>
+            <a:r>
+              <a:rPr lang="en-US" dirty="0" err="1"/>
+              <a:t>validationExercise.sol</a:t>
+            </a:r>
+            <a:endParaRPr lang="en-US" dirty="0"/>
+          </a:p>
+        </p:txBody>
+      </p:sp>
+    </p:spTree>
+    <p:extLst>
+      <p:ext uri="{BB962C8B-B14F-4D97-AF65-F5344CB8AC3E}">
+        <p14:creationId xmlns:p14="http://schemas.microsoft.com/office/powerpoint/2010/main" val="1353823719"/>
+      </p:ext>
+    </p:extLst>
+  </p:cSld>
+  <p:clrMapOvr>
+    <a:masterClrMapping/>
+  </p:clrMapOvr>
+</p:sld>
+</file>
+
+<file path=ppt/slides/slide13.xml><?xml version="1.0" encoding="utf-8"?>
+<p:sld xmlns:a="http://schemas.openxmlformats.org/drawingml/2006/main" xmlns:r="http://schemas.openxmlformats.org/officeDocument/2006/relationships" xmlns:p="http://schemas.openxmlformats.org/presentationml/2006/main">
+  <p:cSld>
+    <p:spTree>
+      <p:nvGrpSpPr>
+        <p:cNvPr id="1" name=""/>
+        <p:cNvGrpSpPr/>
+        <p:nvPr/>
+      </p:nvGrpSpPr>
+      <p:grpSpPr>
+        <a:xfrm>
+          <a:off x="0" y="0"/>
+          <a:ext cx="0" cy="0"/>
+          <a:chOff x="0" y="0"/>
+          <a:chExt cx="0" cy="0"/>
+        </a:xfrm>
+      </p:grpSpPr>
+      <p:sp>
+        <p:nvSpPr>
+          <p:cNvPr id="2" name="Title 1">
+            <a:extLst>
+              <a:ext uri="{FF2B5EF4-FFF2-40B4-BE49-F238E27FC236}">
+                <a16:creationId xmlns:a16="http://schemas.microsoft.com/office/drawing/2014/main" id="{089D0944-E2E0-41EF-904E-CD3C4656F194}"/>
+              </a:ext>
+            </a:extLst>
+          </p:cNvPr>
+          <p:cNvSpPr>
+            <a:spLocks noGrp="1"/>
+          </p:cNvSpPr>
+          <p:nvPr>
+            <p:ph type="title"/>
+          </p:nvPr>
+        </p:nvSpPr>
+        <p:spPr/>
+        <p:txBody>
+          <a:bodyPr/>
+          <a:lstStyle/>
+          <a:p>
+            <a:r>
+              <a:rPr lang="en-US" dirty="0"/>
+              <a:t>Address Example</a:t>
+            </a:r>
+          </a:p>
+        </p:txBody>
+      </p:sp>
+      <p:sp>
+        <p:nvSpPr>
+          <p:cNvPr id="3" name="Content Placeholder 2">
+            <a:extLst>
+              <a:ext uri="{FF2B5EF4-FFF2-40B4-BE49-F238E27FC236}">
+                <a16:creationId xmlns:a16="http://schemas.microsoft.com/office/drawing/2014/main" id="{3A394278-7FA3-4911-90BE-A9136132938A}"/>
+              </a:ext>
+            </a:extLst>
+          </p:cNvPr>
+          <p:cNvSpPr>
+            <a:spLocks noGrp="1"/>
+          </p:cNvSpPr>
+          <p:nvPr>
+            <p:ph idx="1"/>
+          </p:nvPr>
+        </p:nvSpPr>
+        <p:spPr/>
+        <p:txBody>
+          <a:bodyPr/>
+          <a:lstStyle/>
+          <a:p>
+            <a:r>
+              <a:rPr lang="en-US" dirty="0"/>
+              <a:t>In solidity, the address type is used to represent addresses. These could be addresses of wallets or smart contracts.</a:t>
+            </a:r>
+          </a:p>
+          <a:p>
+            <a:r>
+              <a:rPr lang="en-US" dirty="0" err="1"/>
+              <a:t>msg.sender</a:t>
+            </a:r>
+            <a:r>
+              <a:rPr lang="en-US" dirty="0"/>
+              <a:t> is a special variable and refers to the address which is calling the function</a:t>
+            </a:r>
+          </a:p>
+          <a:p>
+            <a:r>
+              <a:rPr lang="en-US" dirty="0"/>
+              <a:t>Example in </a:t>
+            </a:r>
+            <a:r>
+              <a:rPr lang="en-US" dirty="0" err="1"/>
+              <a:t>address.sol</a:t>
+            </a:r>
+            <a:endParaRPr lang="en-US" dirty="0"/>
+          </a:p>
+          <a:p>
+            <a:r>
+              <a:rPr lang="en-US" dirty="0"/>
+              <a:t>Exercise in </a:t>
+            </a:r>
+            <a:r>
+              <a:rPr lang="en-US" dirty="0" err="1"/>
+              <a:t>addressExercise.sol</a:t>
+            </a:r>
+            <a:endParaRPr lang="en-US" dirty="0"/>
+          </a:p>
+        </p:txBody>
+      </p:sp>
+    </p:spTree>
+    <p:extLst>
+      <p:ext uri="{BB962C8B-B14F-4D97-AF65-F5344CB8AC3E}">
+        <p14:creationId xmlns:p14="http://schemas.microsoft.com/office/powerpoint/2010/main" val="2404778782"/>
+      </p:ext>
+    </p:extLst>
+  </p:cSld>
+  <p:clrMapOvr>
+    <a:masterClrMapping/>
+  </p:clrMapOvr>
+</p:sld>
+</file>
+
+<file path=ppt/slides/slide14.xml><?xml version="1.0" encoding="utf-8"?>
+<p:sld xmlns:a="http://schemas.openxmlformats.org/drawingml/2006/main" xmlns:r="http://schemas.openxmlformats.org/officeDocument/2006/relationships" xmlns:p="http://schemas.openxmlformats.org/presentationml/2006/main">
+  <p:cSld>
+    <p:spTree>
+      <p:nvGrpSpPr>
+        <p:cNvPr id="1" name=""/>
+        <p:cNvGrpSpPr/>
+        <p:nvPr/>
+      </p:nvGrpSpPr>
+      <p:grpSpPr>
+        <a:xfrm>
+          <a:off x="0" y="0"/>
+          <a:ext cx="0" cy="0"/>
+          <a:chOff x="0" y="0"/>
+          <a:chExt cx="0" cy="0"/>
+        </a:xfrm>
+      </p:grpSpPr>
+      <p:sp>
+        <p:nvSpPr>
+          <p:cNvPr id="2" name="Title 1">
+            <a:extLst>
+              <a:ext uri="{FF2B5EF4-FFF2-40B4-BE49-F238E27FC236}">
+                <a16:creationId xmlns:a16="http://schemas.microsoft.com/office/drawing/2014/main" id="{089D0944-E2E0-41EF-904E-CD3C4656F194}"/>
+              </a:ext>
+            </a:extLst>
+          </p:cNvPr>
+          <p:cNvSpPr>
+            <a:spLocks noGrp="1"/>
+          </p:cNvSpPr>
+          <p:nvPr>
+            <p:ph type="title"/>
+          </p:nvPr>
+        </p:nvSpPr>
+        <p:spPr/>
+        <p:txBody>
+          <a:bodyPr/>
+          <a:lstStyle/>
+          <a:p>
+            <a:r>
+              <a:rPr lang="en-US" dirty="0"/>
+              <a:t>Mappings Example</a:t>
+            </a:r>
+          </a:p>
+        </p:txBody>
+      </p:sp>
+      <p:sp>
+        <p:nvSpPr>
+          <p:cNvPr id="3" name="Content Placeholder 2">
+            <a:extLst>
+              <a:ext uri="{FF2B5EF4-FFF2-40B4-BE49-F238E27FC236}">
+                <a16:creationId xmlns:a16="http://schemas.microsoft.com/office/drawing/2014/main" id="{3A394278-7FA3-4911-90BE-A9136132938A}"/>
+              </a:ext>
+            </a:extLst>
+          </p:cNvPr>
+          <p:cNvSpPr>
+            <a:spLocks noGrp="1"/>
+          </p:cNvSpPr>
+          <p:nvPr>
+            <p:ph idx="1"/>
+          </p:nvPr>
+        </p:nvSpPr>
+        <p:spPr/>
+        <p:txBody>
+          <a:bodyPr>
+            <a:normAutofit/>
+          </a:bodyPr>
+          <a:lstStyle/>
+          <a:p>
+            <a:r>
+              <a:rPr lang="en-US" dirty="0"/>
+              <a:t>In solidity, one of the most important data types is called a mapping</a:t>
+            </a:r>
+          </a:p>
+          <a:p>
+            <a:r>
+              <a:rPr lang="en-US" dirty="0"/>
+              <a:t>Mappings are key-value pairs (basically like dictionaries in C#)</a:t>
+            </a:r>
+          </a:p>
+          <a:p>
+            <a:r>
+              <a:rPr lang="en-US" dirty="0"/>
+              <a:t>Mappings are frequently used to track balances among other things</a:t>
+            </a:r>
+          </a:p>
+          <a:p>
+            <a:r>
+              <a:rPr lang="en-US" dirty="0"/>
+              <a:t>Example and exercise in </a:t>
+            </a:r>
+            <a:r>
+              <a:rPr lang="en-US" dirty="0" err="1"/>
+              <a:t>mapping.sol</a:t>
+            </a:r>
+            <a:endParaRPr lang="en-US" dirty="0"/>
+          </a:p>
+          <a:p>
+            <a:r>
+              <a:rPr lang="en-US" b="0" dirty="0">
+                <a:solidFill>
+                  <a:srgbClr val="0000FF"/>
+                </a:solidFill>
+                <a:effectLst/>
+                <a:latin typeface="Consolas" panose="020B0609020204030204" pitchFamily="49" charset="0"/>
+              </a:rPr>
+              <a:t>mapping</a:t>
+            </a:r>
+            <a:r>
+              <a:rPr lang="en-US" b="0" dirty="0">
+                <a:solidFill>
+                  <a:srgbClr val="000000"/>
+                </a:solidFill>
+                <a:effectLst/>
+                <a:latin typeface="Consolas" panose="020B0609020204030204" pitchFamily="49" charset="0"/>
+              </a:rPr>
+              <a:t> (</a:t>
+            </a:r>
+            <a:r>
+              <a:rPr lang="en-US" b="0" dirty="0">
+                <a:solidFill>
+                  <a:srgbClr val="267F99"/>
+                </a:solidFill>
+                <a:effectLst/>
+                <a:latin typeface="Consolas" panose="020B0609020204030204" pitchFamily="49" charset="0"/>
+              </a:rPr>
+              <a:t>&lt;</a:t>
+            </a:r>
+            <a:r>
+              <a:rPr lang="en-US" b="0" dirty="0" err="1">
+                <a:solidFill>
+                  <a:srgbClr val="267F99"/>
+                </a:solidFill>
+                <a:effectLst/>
+                <a:latin typeface="Consolas" panose="020B0609020204030204" pitchFamily="49" charset="0"/>
+              </a:rPr>
+              <a:t>keyType</a:t>
+            </a:r>
+            <a:r>
+              <a:rPr lang="en-US" b="0" dirty="0">
+                <a:solidFill>
+                  <a:srgbClr val="267F99"/>
+                </a:solidFill>
+                <a:effectLst/>
+                <a:latin typeface="Consolas" panose="020B0609020204030204" pitchFamily="49" charset="0"/>
+              </a:rPr>
+              <a:t>&gt;</a:t>
+            </a:r>
+            <a:r>
+              <a:rPr lang="en-US" b="0" dirty="0">
+                <a:solidFill>
+                  <a:srgbClr val="000000"/>
+                </a:solidFill>
+                <a:effectLst/>
+                <a:latin typeface="Consolas" panose="020B0609020204030204" pitchFamily="49" charset="0"/>
+              </a:rPr>
+              <a:t> =&gt; </a:t>
+            </a:r>
+            <a:r>
+              <a:rPr lang="en-US" b="0" dirty="0">
+                <a:solidFill>
+                  <a:srgbClr val="267F99"/>
+                </a:solidFill>
+                <a:effectLst/>
+                <a:latin typeface="Consolas" panose="020B0609020204030204" pitchFamily="49" charset="0"/>
+              </a:rPr>
+              <a:t>&lt;</a:t>
+            </a:r>
+            <a:r>
+              <a:rPr lang="en-US" b="0" dirty="0" err="1">
+                <a:solidFill>
+                  <a:srgbClr val="267F99"/>
+                </a:solidFill>
+                <a:effectLst/>
+                <a:latin typeface="Consolas" panose="020B0609020204030204" pitchFamily="49" charset="0"/>
+              </a:rPr>
+              <a:t>valueType</a:t>
+            </a:r>
+            <a:r>
+              <a:rPr lang="en-US" b="0" dirty="0">
+                <a:solidFill>
+                  <a:srgbClr val="267F99"/>
+                </a:solidFill>
+                <a:effectLst/>
+                <a:latin typeface="Consolas" panose="020B0609020204030204" pitchFamily="49" charset="0"/>
+              </a:rPr>
+              <a:t>&gt;</a:t>
+            </a:r>
+            <a:r>
+              <a:rPr lang="en-US" b="0" dirty="0">
+                <a:solidFill>
+                  <a:srgbClr val="000000"/>
+                </a:solidFill>
+                <a:effectLst/>
+                <a:latin typeface="Consolas" panose="020B0609020204030204" pitchFamily="49" charset="0"/>
+              </a:rPr>
+              <a:t>)</a:t>
+            </a:r>
+          </a:p>
+          <a:p>
+            <a:endParaRPr lang="en-US" dirty="0"/>
+          </a:p>
+        </p:txBody>
+      </p:sp>
+    </p:spTree>
+    <p:extLst>
+      <p:ext uri="{BB962C8B-B14F-4D97-AF65-F5344CB8AC3E}">
+        <p14:creationId xmlns:p14="http://schemas.microsoft.com/office/powerpoint/2010/main" val="644532071"/>
+      </p:ext>
+    </p:extLst>
+  </p:cSld>
+  <p:clrMapOvr>
+    <a:masterClrMapping/>
+  </p:clrMapOvr>
+</p:sld>
+</file>
+
+<file path=ppt/slides/slide15.xml><?xml version="1.0" encoding="utf-8"?>
+<p:sld xmlns:a="http://schemas.openxmlformats.org/drawingml/2006/main" xmlns:r="http://schemas.openxmlformats.org/officeDocument/2006/relationships" xmlns:p="http://schemas.openxmlformats.org/presentationml/2006/main">
+  <p:cSld>
+    <p:spTree>
+      <p:nvGrpSpPr>
+        <p:cNvPr id="1" name=""/>
+        <p:cNvGrpSpPr/>
+        <p:nvPr/>
+      </p:nvGrpSpPr>
+      <p:grpSpPr>
+        <a:xfrm>
+          <a:off x="0" y="0"/>
+          <a:ext cx="0" cy="0"/>
+          <a:chOff x="0" y="0"/>
+          <a:chExt cx="0" cy="0"/>
+        </a:xfrm>
+      </p:grpSpPr>
+      <p:sp>
+        <p:nvSpPr>
+          <p:cNvPr id="2" name="Title 1">
+            <a:extLst>
+              <a:ext uri="{FF2B5EF4-FFF2-40B4-BE49-F238E27FC236}">
+                <a16:creationId xmlns:a16="http://schemas.microsoft.com/office/drawing/2014/main" id="{1A82571D-922E-4DF3-8CC8-4D700FE06BA3}"/>
+              </a:ext>
+            </a:extLst>
+          </p:cNvPr>
+          <p:cNvSpPr>
+            <a:spLocks noGrp="1"/>
+          </p:cNvSpPr>
+          <p:nvPr>
+            <p:ph type="title"/>
+          </p:nvPr>
+        </p:nvSpPr>
+        <p:spPr/>
+        <p:txBody>
+          <a:bodyPr/>
+          <a:lstStyle/>
+          <a:p>
+            <a:r>
+              <a:rPr lang="en-US" dirty="0"/>
+              <a:t>More Resources</a:t>
+            </a:r>
+          </a:p>
+        </p:txBody>
+      </p:sp>
+      <p:sp>
+        <p:nvSpPr>
+          <p:cNvPr id="3" name="Content Placeholder 2">
+            <a:extLst>
+              <a:ext uri="{FF2B5EF4-FFF2-40B4-BE49-F238E27FC236}">
+                <a16:creationId xmlns:a16="http://schemas.microsoft.com/office/drawing/2014/main" id="{0E6B0C2D-9584-48EF-BD5B-37E83D7FD04F}"/>
+              </a:ext>
+            </a:extLst>
+          </p:cNvPr>
+          <p:cNvSpPr>
+            <a:spLocks noGrp="1"/>
+          </p:cNvSpPr>
+          <p:nvPr>
+            <p:ph idx="1"/>
+          </p:nvPr>
+        </p:nvSpPr>
+        <p:spPr/>
+        <p:txBody>
+          <a:bodyPr/>
+          <a:lstStyle/>
+          <a:p>
+            <a:endParaRPr lang="en-US"/>
+          </a:p>
+        </p:txBody>
+      </p:sp>
+    </p:spTree>
+    <p:extLst>
+      <p:ext uri="{BB962C8B-B14F-4D97-AF65-F5344CB8AC3E}">
+        <p14:creationId xmlns:p14="http://schemas.microsoft.com/office/powerpoint/2010/main" val="2724427358"/>
       </p:ext>
     </p:extLst>
   </p:cSld>

</xml_diff>